<commit_message>
Set a new transparency level
</commit_message>
<xml_diff>
--- a/Presentations/3th Workshop/WorkShop_Template.pptx
+++ b/Presentations/3th Workshop/WorkShop_Template.pptx
@@ -266,7 +266,7 @@
             </a:pPr>
             <a:fld id="{7469AA65-E62E-EF4B-AFC4-634F876BDCA0}" type="datetime1">
               <a:rPr lang="en-US" smtClean="0"/>
-              <a:t>9/18/14</a:t>
+              <a:t>9/25/14</a:t>
             </a:fld>
             <a:endParaRPr lang="en-US" dirty="0"/>
           </a:p>
@@ -487,7 +487,7 @@
             </a:pPr>
             <a:fld id="{2C82CE73-D806-024D-AFB1-8C2F723B5FB7}" type="datetime1">
               <a:rPr lang="en-US" smtClean="0"/>
-              <a:t>9/18/14</a:t>
+              <a:t>9/25/14</a:t>
             </a:fld>
             <a:endParaRPr lang="en-US" dirty="0"/>
           </a:p>
@@ -2872,7 +2872,7 @@
         </p:nvPicPr>
         <p:blipFill>
           <a:blip r:embed="rId10">
-            <a:alphaModFix amt="38000"/>
+            <a:alphaModFix amt="20000"/>
             <a:extLst>
               <a:ext uri="{28A0092B-C50C-407E-A947-70E740481C1C}">
                 <a14:useLocalDpi xmlns:a14="http://schemas.microsoft.com/office/drawing/2010/main" val="0"/>

</xml_diff>